<commit_message>
CSS toegevoegd in de Poker JSP's
</commit_message>
<xml_diff>
--- a/Case presentatie~4.pptx
+++ b/Case presentatie~4.pptx
@@ -3106,6 +3106,42 @@
           <a:chExt cx="0" cy="0"/>
         </a:xfrm>
       </p:grpSpPr>
+      <p:pic>
+        <p:nvPicPr>
+          <p:cNvPr id="1026" name="Picture 2"/>
+          <p:cNvPicPr>
+            <a:picLocks noChangeAspect="1" noChangeArrowheads="1"/>
+          </p:cNvPicPr>
+          <p:nvPr/>
+        </p:nvPicPr>
+        <p:blipFill>
+          <a:blip r:embed="rId2">
+            <a:extLst>
+              <a:ext uri="{28A0092B-C50C-407E-A947-70E740481C1C}">
+                <a14:useLocalDpi xmlns:a14="http://schemas.microsoft.com/office/drawing/2010/main" val="0"/>
+              </a:ext>
+            </a:extLst>
+          </a:blip>
+          <a:srcRect/>
+          <a:stretch>
+            <a:fillRect/>
+          </a:stretch>
+        </p:blipFill>
+        <p:spPr bwMode="auto">
+          <a:xfrm>
+            <a:off x="7736326" y="4940374"/>
+            <a:ext cx="1407674" cy="1916832"/>
+          </a:xfrm>
+          <a:prstGeom prst="rect">
+            <a:avLst/>
+          </a:prstGeom>
+          <a:noFill/>
+          <a:ln>
+            <a:noFill/>
+          </a:ln>
+          <a:effectLst/>
+        </p:spPr>
+      </p:pic>
       <p:sp>
         <p:nvSpPr>
           <p:cNvPr id="2" name="Titel 1"/>
@@ -3123,7 +3159,7 @@
           <a:p>
             <a:r>
               <a:rPr lang="nl-NL" dirty="0" smtClean="0"/>
-              <a:t>Case presentatie</a:t>
+              <a:t>Kaartspellen online</a:t>
             </a:r>
             <a:endParaRPr lang="nl-NL" dirty="0"/>
           </a:p>
@@ -3152,6 +3188,114 @@
           </a:p>
         </p:txBody>
       </p:sp>
+      <p:pic>
+        <p:nvPicPr>
+          <p:cNvPr id="5" name="Picture 2"/>
+          <p:cNvPicPr>
+            <a:picLocks noChangeAspect="1" noChangeArrowheads="1"/>
+          </p:cNvPicPr>
+          <p:nvPr/>
+        </p:nvPicPr>
+        <p:blipFill>
+          <a:blip r:embed="rId2">
+            <a:extLst>
+              <a:ext uri="{28A0092B-C50C-407E-A947-70E740481C1C}">
+                <a14:useLocalDpi xmlns:a14="http://schemas.microsoft.com/office/drawing/2010/main" val="0"/>
+              </a:ext>
+            </a:extLst>
+          </a:blip>
+          <a:srcRect/>
+          <a:stretch>
+            <a:fillRect/>
+          </a:stretch>
+        </p:blipFill>
+        <p:spPr bwMode="auto">
+          <a:xfrm>
+            <a:off x="7736326" y="0"/>
+            <a:ext cx="1407674" cy="1916832"/>
+          </a:xfrm>
+          <a:prstGeom prst="rect">
+            <a:avLst/>
+          </a:prstGeom>
+          <a:noFill/>
+          <a:ln>
+            <a:noFill/>
+          </a:ln>
+          <a:effectLst/>
+        </p:spPr>
+      </p:pic>
+      <p:pic>
+        <p:nvPicPr>
+          <p:cNvPr id="6" name="Picture 2"/>
+          <p:cNvPicPr>
+            <a:picLocks noChangeAspect="1" noChangeArrowheads="1"/>
+          </p:cNvPicPr>
+          <p:nvPr/>
+        </p:nvPicPr>
+        <p:blipFill>
+          <a:blip r:embed="rId2">
+            <a:extLst>
+              <a:ext uri="{28A0092B-C50C-407E-A947-70E740481C1C}">
+                <a14:useLocalDpi xmlns:a14="http://schemas.microsoft.com/office/drawing/2010/main" val="0"/>
+              </a:ext>
+            </a:extLst>
+          </a:blip>
+          <a:srcRect/>
+          <a:stretch>
+            <a:fillRect/>
+          </a:stretch>
+        </p:blipFill>
+        <p:spPr bwMode="auto">
+          <a:xfrm>
+            <a:off x="9847" y="0"/>
+            <a:ext cx="1407674" cy="1916832"/>
+          </a:xfrm>
+          <a:prstGeom prst="rect">
+            <a:avLst/>
+          </a:prstGeom>
+          <a:noFill/>
+          <a:ln>
+            <a:noFill/>
+          </a:ln>
+          <a:effectLst/>
+        </p:spPr>
+      </p:pic>
+      <p:pic>
+        <p:nvPicPr>
+          <p:cNvPr id="7" name="Picture 2"/>
+          <p:cNvPicPr>
+            <a:picLocks noChangeAspect="1" noChangeArrowheads="1"/>
+          </p:cNvPicPr>
+          <p:nvPr/>
+        </p:nvPicPr>
+        <p:blipFill>
+          <a:blip r:embed="rId2">
+            <a:extLst>
+              <a:ext uri="{28A0092B-C50C-407E-A947-70E740481C1C}">
+                <a14:useLocalDpi xmlns:a14="http://schemas.microsoft.com/office/drawing/2010/main" val="0"/>
+              </a:ext>
+            </a:extLst>
+          </a:blip>
+          <a:srcRect/>
+          <a:stretch>
+            <a:fillRect/>
+          </a:stretch>
+        </p:blipFill>
+        <p:spPr bwMode="auto">
+          <a:xfrm>
+            <a:off x="9847" y="4917926"/>
+            <a:ext cx="1407674" cy="1916832"/>
+          </a:xfrm>
+          <a:prstGeom prst="rect">
+            <a:avLst/>
+          </a:prstGeom>
+          <a:noFill/>
+          <a:ln>
+            <a:noFill/>
+          </a:ln>
+          <a:effectLst/>
+        </p:spPr>
+      </p:pic>
     </p:spTree>
     <p:extLst>
       <p:ext uri="{BB962C8B-B14F-4D97-AF65-F5344CB8AC3E}">
@@ -4115,7 +4259,6 @@
               <a:rPr lang="nl-NL" sz="1600" dirty="0" smtClean="0"/>
               <a:t>Vragen</a:t>
             </a:r>
-            <a:endParaRPr lang="nl-NL" sz="1600" dirty="0" smtClean="0"/>
           </a:p>
           <a:p>
             <a:pPr marL="355600" indent="-355600" algn="l">

</xml_diff>